<commit_message>
Buff on HP, Stagger Resister
</commit_message>
<xml_diff>
--- a/롭티알_진행.pptx
+++ b/롭티알_진행.pptx
@@ -237,7 +237,7 @@
           <a:p>
             <a:fld id="{09B76076-15DE-4B7E-A82A-F48BDC23270C}" type="datetimeFigureOut">
               <a:rPr lang="ko-KR" altLang="en-US" smtClean="0"/>
-              <a:t>2021-04-04</a:t>
+              <a:t>2021-04-15</a:t>
             </a:fld>
             <a:endParaRPr lang="ko-KR" altLang="en-US" dirty="0"/>
           </a:p>
@@ -414,7 +414,7 @@
           <a:p>
             <a:fld id="{7D967916-D498-430A-BC28-8D3F4DCC62EC}" type="datetimeFigureOut">
               <a:rPr lang="ko-KR" altLang="en-US" smtClean="0"/>
-              <a:t>2021-04-04</a:t>
+              <a:t>2021-04-15</a:t>
             </a:fld>
             <a:endParaRPr lang="ko-KR" altLang="en-US" dirty="0"/>
           </a:p>
@@ -7938,7 +7938,7 @@
                   </a:schemeClr>
                 </a:solidFill>
               </a:rPr>
-              <a:t>10+</a:t>
+              <a:t>8+</a:t>
             </a:r>
             <a:r>
               <a:rPr lang="ko-KR" altLang="en-US" sz="1600" b="1" dirty="0">
@@ -7958,7 +7958,7 @@
                   </a:schemeClr>
                 </a:solidFill>
               </a:rPr>
-              <a:t>*2</a:t>
+              <a:t>*2+</a:t>
             </a:r>
             <a:r>
               <a:rPr lang="ko-KR" altLang="en-US" sz="1600" dirty="0">
@@ -7968,17 +7968,17 @@
                   </a:schemeClr>
                 </a:solidFill>
               </a:rPr>
-              <a:t>만큼 </a:t>
-            </a:r>
-            <a:r>
-              <a:rPr lang="ko-KR" altLang="en-US" sz="1600" b="1" dirty="0">
+              <a:t>등급</a:t>
+            </a:r>
+            <a:r>
+              <a:rPr lang="en-US" altLang="ko-KR" sz="1600" dirty="0">
                 <a:solidFill>
                   <a:schemeClr val="bg1">
                     <a:lumMod val="95000"/>
                   </a:schemeClr>
                 </a:solidFill>
               </a:rPr>
-              <a:t>체력</a:t>
+              <a:t>*2</a:t>
             </a:r>
             <a:r>
               <a:rPr lang="ko-KR" altLang="en-US" sz="1600" dirty="0">
@@ -7988,79 +7988,79 @@
                   </a:schemeClr>
                 </a:solidFill>
               </a:rPr>
-              <a:t> 회복</a:t>
-            </a:r>
-            <a:r>
-              <a:rPr lang="en-US" altLang="ko-KR" sz="1600" dirty="0">
+              <a:t>만큼 </a:t>
+            </a:r>
+            <a:r>
+              <a:rPr lang="ko-KR" altLang="en-US" sz="1600" b="1" dirty="0">
                 <a:solidFill>
                   <a:schemeClr val="bg1">
                     <a:lumMod val="95000"/>
                   </a:schemeClr>
                 </a:solidFill>
               </a:rPr>
-              <a:t>.	</a:t>
-            </a:r>
-            <a:r>
-              <a:rPr lang="ko-KR" altLang="en-US" sz="1600" b="1" dirty="0">
+              <a:t>체력</a:t>
+            </a:r>
+            <a:r>
+              <a:rPr lang="ko-KR" altLang="en-US" sz="1600" dirty="0">
                 <a:solidFill>
                   <a:schemeClr val="bg1">
                     <a:lumMod val="95000"/>
                   </a:schemeClr>
                 </a:solidFill>
               </a:rPr>
-              <a:t>흐트러짐 저항 모두 </a:t>
-            </a:r>
-            <a:r>
-              <a:rPr lang="ko-KR" altLang="en-US" sz="1600" dirty="0">
+              <a:t> 회복</a:t>
+            </a:r>
+            <a:r>
+              <a:rPr lang="en-US" altLang="ko-KR" sz="1600" dirty="0">
                 <a:solidFill>
                   <a:schemeClr val="bg1">
                     <a:lumMod val="95000"/>
                   </a:schemeClr>
                 </a:solidFill>
               </a:rPr>
-              <a:t>회복</a:t>
-            </a:r>
-            <a:r>
-              <a:rPr lang="en-US" altLang="ko-KR" sz="1600" dirty="0">
+              <a:t>.	</a:t>
+            </a:r>
+            <a:r>
+              <a:rPr lang="ko-KR" altLang="en-US" sz="1600" b="1" dirty="0">
                 <a:solidFill>
                   <a:schemeClr val="bg1">
                     <a:lumMod val="95000"/>
                   </a:schemeClr>
                 </a:solidFill>
               </a:rPr>
-              <a:t>.</a:t>
-            </a:r>
-          </a:p>
-          <a:p>
-            <a:r>
-              <a:rPr lang="en-US" altLang="ko-KR" sz="1600" dirty="0">
+              <a:t>흐트러짐 저항 모두 </a:t>
+            </a:r>
+            <a:r>
+              <a:rPr lang="ko-KR" altLang="en-US" sz="1600" dirty="0">
                 <a:solidFill>
                   <a:schemeClr val="bg1">
                     <a:lumMod val="95000"/>
                   </a:schemeClr>
                 </a:solidFill>
               </a:rPr>
-              <a:t>3+</a:t>
-            </a:r>
-            <a:r>
-              <a:rPr lang="ko-KR" altLang="en-US" sz="1600" b="1" dirty="0">
+              <a:t>회복</a:t>
+            </a:r>
+            <a:r>
+              <a:rPr lang="en-US" altLang="ko-KR" sz="1600" dirty="0">
                 <a:solidFill>
                   <a:schemeClr val="bg1">
                     <a:lumMod val="95000"/>
                   </a:schemeClr>
                 </a:solidFill>
               </a:rPr>
-              <a:t>지혜</a:t>
-            </a:r>
-            <a:r>
-              <a:rPr lang="ko-KR" altLang="en-US" sz="1600" dirty="0">
+              <a:t>.</a:t>
+            </a:r>
+          </a:p>
+          <a:p>
+            <a:r>
+              <a:rPr lang="en-US" altLang="ko-KR" sz="1600" dirty="0">
                 <a:solidFill>
                   <a:schemeClr val="bg1">
                     <a:lumMod val="95000"/>
                   </a:schemeClr>
                 </a:solidFill>
               </a:rPr>
-              <a:t>만큼 </a:t>
+              <a:t>3+</a:t>
             </a:r>
             <a:r>
               <a:rPr lang="ko-KR" altLang="en-US" sz="1600" b="1" dirty="0">
@@ -8070,7 +8070,7 @@
                   </a:schemeClr>
                 </a:solidFill>
               </a:rPr>
-              <a:t>정신력</a:t>
+              <a:t>지혜</a:t>
             </a:r>
             <a:r>
               <a:rPr lang="ko-KR" altLang="en-US" sz="1600" dirty="0">
@@ -8080,17 +8080,37 @@
                   </a:schemeClr>
                 </a:solidFill>
               </a:rPr>
-              <a:t> 회복</a:t>
-            </a:r>
-            <a:r>
-              <a:rPr lang="en-US" altLang="ko-KR" sz="1600" dirty="0">
+              <a:t>만큼 </a:t>
+            </a:r>
+            <a:r>
+              <a:rPr lang="ko-KR" altLang="en-US" sz="1600" b="1" dirty="0">
                 <a:solidFill>
                   <a:schemeClr val="bg1">
                     <a:lumMod val="95000"/>
                   </a:schemeClr>
                 </a:solidFill>
               </a:rPr>
-              <a:t>.	</a:t>
+              <a:t>정신력</a:t>
+            </a:r>
+            <a:r>
+              <a:rPr lang="ko-KR" altLang="en-US" sz="1600" dirty="0">
+                <a:solidFill>
+                  <a:schemeClr val="bg1">
+                    <a:lumMod val="95000"/>
+                  </a:schemeClr>
+                </a:solidFill>
+              </a:rPr>
+              <a:t> 회복</a:t>
+            </a:r>
+            <a:r>
+              <a:rPr lang="en-US" altLang="ko-KR" sz="1600" dirty="0">
+                <a:solidFill>
+                  <a:schemeClr val="bg1">
+                    <a:lumMod val="95000"/>
+                  </a:schemeClr>
+                </a:solidFill>
+              </a:rPr>
+              <a:t>.		</a:t>
             </a:r>
             <a:r>
               <a:rPr lang="ko-KR" altLang="en-US" sz="1600" b="1" dirty="0">
@@ -8156,8 +8176,8 @@
         </p:nvSpPr>
         <p:spPr>
           <a:xfrm>
-            <a:off x="6399528" y="6019920"/>
-            <a:ext cx="5618032" cy="646331"/>
+            <a:off x="6676662" y="6019920"/>
+            <a:ext cx="5340898" cy="646331"/>
           </a:xfrm>
           <a:prstGeom prst="rect">
             <a:avLst/>
@@ -8303,14 +8323,12 @@
           </p:cNvPr>
           <p:cNvCxnSpPr>
             <a:cxnSpLocks/>
-            <a:stCxn id="45" idx="0"/>
-            <a:endCxn id="45" idx="2"/>
           </p:cNvCxnSpPr>
           <p:nvPr userDrawn="1"/>
         </p:nvCxnSpPr>
         <p:spPr>
           <a:xfrm>
-            <a:off x="6096000" y="5894531"/>
+            <a:off x="6573968" y="5894531"/>
             <a:ext cx="0" cy="973352"/>
           </a:xfrm>
           <a:prstGeom prst="line">
@@ -10353,7 +10371,7 @@
                   </a:schemeClr>
                 </a:solidFill>
               </a:rPr>
-              <a:t>별다른 언급이 없다면 라운드 종료 시 상태이상이 사라지게 됨</a:t>
+              <a:t>충전은 효과가 없는 자원으로 취급</a:t>
             </a:r>
             <a:r>
               <a:rPr lang="en-US" altLang="ko-KR" sz="1400" dirty="0">
@@ -10376,7 +10394,7 @@
                   </a:schemeClr>
                 </a:solidFill>
               </a:rPr>
-              <a:t>충전은 효과가 없으며</a:t>
+              <a:t>화상</a:t>
             </a:r>
             <a:r>
               <a:rPr lang="en-US" altLang="ko-KR" sz="1400" dirty="0">
@@ -10396,7 +10414,47 @@
                   </a:schemeClr>
                 </a:solidFill>
               </a:rPr>
-              <a:t>사라지지 않음</a:t>
+              <a:t>연기</a:t>
+            </a:r>
+            <a:r>
+              <a:rPr lang="en-US" altLang="ko-KR" sz="1400" dirty="0">
+                <a:solidFill>
+                  <a:schemeClr val="tx1">
+                    <a:lumMod val="85000"/>
+                  </a:schemeClr>
+                </a:solidFill>
+              </a:rPr>
+              <a:t>, </a:t>
+            </a:r>
+            <a:r>
+              <a:rPr lang="ko-KR" altLang="en-US" sz="1400" dirty="0">
+                <a:solidFill>
+                  <a:schemeClr val="tx1">
+                    <a:lumMod val="85000"/>
+                  </a:schemeClr>
+                </a:solidFill>
+              </a:rPr>
+              <a:t>충전을 제외한 상태이상은</a:t>
+            </a:r>
+            <a:r>
+              <a:rPr lang="en-US" altLang="ko-KR" sz="1400" dirty="0">
+                <a:solidFill>
+                  <a:schemeClr val="tx1">
+                    <a:lumMod val="85000"/>
+                  </a:schemeClr>
+                </a:solidFill>
+              </a:rPr>
+              <a:t> </a:t>
+            </a:r>
+            <a:r>
+              <a:rPr lang="ko-KR" altLang="en-US" sz="1400" dirty="0">
+                <a:solidFill>
+                  <a:schemeClr val="tx1">
+                    <a:lumMod val="85000"/>
+                  </a:schemeClr>
+                </a:solidFill>
+              </a:rPr>
+              <a:t>라운드 종료 시 사라짐</a:t>
             </a:r>
             <a:r>
               <a:rPr lang="en-US" altLang="ko-KR" sz="1400" dirty="0">
@@ -29750,7 +29808,7 @@
           <a:p>
             <a:fld id="{E82905C0-181C-4758-B521-0A1AC33AF7B8}" type="datetime1">
               <a:rPr lang="ko-KR" altLang="en-US" smtClean="0"/>
-              <a:t>2021-04-04</a:t>
+              <a:t>2021-04-15</a:t>
             </a:fld>
             <a:endParaRPr lang="ko-KR" altLang="en-US" dirty="0"/>
           </a:p>
@@ -34860,12 +34918,9 @@
 </file>
 
 <file path=customXml/item1.xml><?xml version="1.0" encoding="utf-8"?>
-<?mso-contentType ?>
-<FormTemplates xmlns="http://schemas.microsoft.com/sharepoint/v3/contenttype/forms">
-  <Display>DocumentLibraryForm</Display>
-  <Edit>DocumentLibraryForm</Edit>
-  <New>DocumentLibraryForm</New>
-</FormTemplates>
+<p:properties xmlns:p="http://schemas.microsoft.com/office/2006/metadata/properties" xmlns:xsi="http://www.w3.org/2001/XMLSchema-instance" xmlns:pc="http://schemas.microsoft.com/office/infopath/2007/PartnerControls">
+  <documentManagement/>
+</p:properties>
 </file>
 
 <file path=customXml/item2.xml><?xml version="1.0" encoding="utf-8"?>
@@ -35001,15 +35056,26 @@
 </file>
 
 <file path=customXml/item3.xml><?xml version="1.0" encoding="utf-8"?>
-<p:properties xmlns:p="http://schemas.microsoft.com/office/2006/metadata/properties" xmlns:xsi="http://www.w3.org/2001/XMLSchema-instance" xmlns:pc="http://schemas.microsoft.com/office/infopath/2007/PartnerControls">
-  <documentManagement/>
-</p:properties>
+<?mso-contentType ?>
+<FormTemplates xmlns="http://schemas.microsoft.com/sharepoint/v3/contenttype/forms">
+  <Display>DocumentLibraryForm</Display>
+  <Edit>DocumentLibraryForm</Edit>
+  <New>DocumentLibraryForm</New>
+</FormTemplates>
 </file>
 
 <file path=customXml/itemProps1.xml><?xml version="1.0" encoding="utf-8"?>
-<ds:datastoreItem xmlns:ds="http://schemas.openxmlformats.org/officeDocument/2006/customXml" ds:itemID="{58B6FD7C-6D9F-4A7E-AE56-6E092CF6CBA3}">
+<ds:datastoreItem xmlns:ds="http://schemas.openxmlformats.org/officeDocument/2006/customXml" ds:itemID="{F3FC7834-CB9D-4A31-B6BC-AEB80B85DAE3}">
   <ds:schemaRefs>
-    <ds:schemaRef ds:uri="http://schemas.microsoft.com/sharepoint/v3/contenttype/forms"/>
+    <ds:schemaRef ds:uri="http://purl.org/dc/elements/1.1/"/>
+    <ds:schemaRef ds:uri="http://schemas.microsoft.com/office/infopath/2007/PartnerControls"/>
+    <ds:schemaRef ds:uri="http://purl.org/dc/dcmitype/"/>
+    <ds:schemaRef ds:uri="http://schemas.microsoft.com/office/2006/metadata/properties"/>
+    <ds:schemaRef ds:uri="7a556669-b9f6-4696-b260-7ff151b9728a"/>
+    <ds:schemaRef ds:uri="http://schemas.microsoft.com/office/2006/documentManagement/types"/>
+    <ds:schemaRef ds:uri="http://www.w3.org/XML/1998/namespace"/>
+    <ds:schemaRef ds:uri="http://schemas.openxmlformats.org/package/2006/metadata/core-properties"/>
+    <ds:schemaRef ds:uri="http://purl.org/dc/terms/"/>
   </ds:schemaRefs>
 </ds:datastoreItem>
 </file>
@@ -35033,17 +35099,9 @@
 </file>
 
 <file path=customXml/itemProps3.xml><?xml version="1.0" encoding="utf-8"?>
-<ds:datastoreItem xmlns:ds="http://schemas.openxmlformats.org/officeDocument/2006/customXml" ds:itemID="{F3FC7834-CB9D-4A31-B6BC-AEB80B85DAE3}">
+<ds:datastoreItem xmlns:ds="http://schemas.openxmlformats.org/officeDocument/2006/customXml" ds:itemID="{58B6FD7C-6D9F-4A7E-AE56-6E092CF6CBA3}">
   <ds:schemaRefs>
-    <ds:schemaRef ds:uri="http://purl.org/dc/elements/1.1/"/>
-    <ds:schemaRef ds:uri="http://schemas.microsoft.com/office/infopath/2007/PartnerControls"/>
-    <ds:schemaRef ds:uri="http://purl.org/dc/dcmitype/"/>
-    <ds:schemaRef ds:uri="http://schemas.microsoft.com/office/2006/metadata/properties"/>
-    <ds:schemaRef ds:uri="7a556669-b9f6-4696-b260-7ff151b9728a"/>
-    <ds:schemaRef ds:uri="http://schemas.microsoft.com/office/2006/documentManagement/types"/>
-    <ds:schemaRef ds:uri="http://www.w3.org/XML/1998/namespace"/>
-    <ds:schemaRef ds:uri="http://schemas.openxmlformats.org/package/2006/metadata/core-properties"/>
-    <ds:schemaRef ds:uri="http://purl.org/dc/terms/"/>
+    <ds:schemaRef ds:uri="http://schemas.microsoft.com/sharepoint/v3/contenttype/forms"/>
   </ds:schemaRefs>
 </ds:datastoreItem>
 </file>
</xml_diff>